<commit_message>
Update What will the apples cost.pptx
</commit_message>
<xml_diff>
--- a/What will the apples cost.pptx
+++ b/What will the apples cost.pptx
@@ -221,7 +221,7 @@
           <a:p>
             <a:fld id="{629A96A4-1186-4882-8DDD-E80CC8338E5A}" type="datetimeFigureOut">
               <a:rPr lang="en-ZA" smtClean="0"/>
-              <a:t>2021/05/24</a:t>
+              <a:t>2021/05/25</a:t>
             </a:fld>
             <a:endParaRPr lang="en-ZA"/>
           </a:p>
@@ -746,7 +746,7 @@
           <a:p>
             <a:fld id="{A7B94748-A6E0-434A-9232-487C2E69F84F}" type="datetimeFigureOut">
               <a:rPr lang="en-ZA" smtClean="0"/>
-              <a:t>2021/05/24</a:t>
+              <a:t>2021/05/25</a:t>
             </a:fld>
             <a:endParaRPr lang="en-ZA"/>
           </a:p>
@@ -911,7 +911,7 @@
           <a:p>
             <a:fld id="{A7B94748-A6E0-434A-9232-487C2E69F84F}" type="datetimeFigureOut">
               <a:rPr lang="en-ZA" smtClean="0"/>
-              <a:t>2021/05/24</a:t>
+              <a:t>2021/05/25</a:t>
             </a:fld>
             <a:endParaRPr lang="en-ZA"/>
           </a:p>
@@ -1086,7 +1086,7 @@
           <a:p>
             <a:fld id="{A7B94748-A6E0-434A-9232-487C2E69F84F}" type="datetimeFigureOut">
               <a:rPr lang="en-ZA" smtClean="0"/>
-              <a:t>2021/05/24</a:t>
+              <a:t>2021/05/25</a:t>
             </a:fld>
             <a:endParaRPr lang="en-ZA"/>
           </a:p>
@@ -1251,7 +1251,7 @@
           <a:p>
             <a:fld id="{A7B94748-A6E0-434A-9232-487C2E69F84F}" type="datetimeFigureOut">
               <a:rPr lang="en-ZA" smtClean="0"/>
-              <a:t>2021/05/24</a:t>
+              <a:t>2021/05/25</a:t>
             </a:fld>
             <a:endParaRPr lang="en-ZA"/>
           </a:p>
@@ -1493,7 +1493,7 @@
           <a:p>
             <a:fld id="{A7B94748-A6E0-434A-9232-487C2E69F84F}" type="datetimeFigureOut">
               <a:rPr lang="en-ZA" smtClean="0"/>
-              <a:t>2021/05/24</a:t>
+              <a:t>2021/05/25</a:t>
             </a:fld>
             <a:endParaRPr lang="en-ZA"/>
           </a:p>
@@ -1757,7 +1757,7 @@
           <a:p>
             <a:fld id="{A7B94748-A6E0-434A-9232-487C2E69F84F}" type="datetimeFigureOut">
               <a:rPr lang="en-ZA" smtClean="0"/>
-              <a:t>2021/05/24</a:t>
+              <a:t>2021/05/25</a:t>
             </a:fld>
             <a:endParaRPr lang="en-ZA"/>
           </a:p>
@@ -2135,7 +2135,7 @@
           <a:p>
             <a:fld id="{A7B94748-A6E0-434A-9232-487C2E69F84F}" type="datetimeFigureOut">
               <a:rPr lang="en-ZA" smtClean="0"/>
-              <a:t>2021/05/24</a:t>
+              <a:t>2021/05/25</a:t>
             </a:fld>
             <a:endParaRPr lang="en-ZA"/>
           </a:p>
@@ -2285,7 +2285,7 @@
           <a:p>
             <a:fld id="{A7B94748-A6E0-434A-9232-487C2E69F84F}" type="datetimeFigureOut">
               <a:rPr lang="en-ZA" smtClean="0"/>
-              <a:t>2021/05/24</a:t>
+              <a:t>2021/05/25</a:t>
             </a:fld>
             <a:endParaRPr lang="en-ZA"/>
           </a:p>
@@ -2375,7 +2375,7 @@
           <a:p>
             <a:fld id="{A7B94748-A6E0-434A-9232-487C2E69F84F}" type="datetimeFigureOut">
               <a:rPr lang="en-ZA" smtClean="0"/>
-              <a:t>2021/05/24</a:t>
+              <a:t>2021/05/25</a:t>
             </a:fld>
             <a:endParaRPr lang="en-ZA"/>
           </a:p>
@@ -2636,7 +2636,7 @@
           <a:p>
             <a:fld id="{A7B94748-A6E0-434A-9232-487C2E69F84F}" type="datetimeFigureOut">
               <a:rPr lang="en-ZA" smtClean="0"/>
-              <a:t>2021/05/24</a:t>
+              <a:t>2021/05/25</a:t>
             </a:fld>
             <a:endParaRPr lang="en-ZA"/>
           </a:p>
@@ -2924,7 +2924,7 @@
           <a:p>
             <a:fld id="{A7B94748-A6E0-434A-9232-487C2E69F84F}" type="datetimeFigureOut">
               <a:rPr lang="en-ZA" smtClean="0"/>
-              <a:t>2021/05/24</a:t>
+              <a:t>2021/05/25</a:t>
             </a:fld>
             <a:endParaRPr lang="en-ZA"/>
           </a:p>
@@ -3695,7 +3695,7 @@
           <a:p>
             <a:fld id="{A7B94748-A6E0-434A-9232-487C2E69F84F}" type="datetimeFigureOut">
               <a:rPr lang="en-ZA" smtClean="0"/>
-              <a:t>2021/05/24</a:t>
+              <a:t>2021/05/25</a:t>
             </a:fld>
             <a:endParaRPr lang="en-ZA"/>
           </a:p>
@@ -9342,11 +9342,7 @@
           <a:p>
             <a:r>
               <a:rPr lang="en-ZA" dirty="0" smtClean="0"/>
-              <a:t>Step 4: Building the </a:t>
-            </a:r>
-            <a:r>
-              <a:rPr lang="en-ZA" dirty="0" smtClean="0"/>
-              <a:t>models [</a:t>
+              <a:t>Step 4: Building the models [</a:t>
             </a:r>
             <a:r>
               <a:rPr lang="en-ZA" dirty="0" err="1" smtClean="0"/>
@@ -9427,11 +9423,7 @@
                     <a:p>
                       <a:r>
                         <a:rPr lang="en-ZA" dirty="0" smtClean="0"/>
-                        <a:t>1. Multivariate </a:t>
-                      </a:r>
-                      <a:r>
-                        <a:rPr lang="en-ZA" dirty="0" smtClean="0"/>
-                        <a:t>Linear Regression Model</a:t>
+                        <a:t>1. Multivariate Linear Regression Model</a:t>
                       </a:r>
                       <a:endParaRPr lang="en-ZA" dirty="0"/>
                     </a:p>
@@ -11599,7 +11591,7 @@
         </p:nvGraphicFramePr>
         <p:xfrm>
           <a:off x="251520" y="1340768"/>
-          <a:ext cx="8578850" cy="4769485"/>
+          <a:ext cx="8578850" cy="4846320"/>
         </p:xfrm>
         <a:graphic>
           <a:graphicData uri="http://schemas.openxmlformats.org/drawingml/2006/table">
@@ -13689,11 +13681,7 @@
             </a:r>
             <a:r>
               <a:rPr lang="en-ZA" dirty="0" smtClean="0"/>
-              <a:t> </a:t>
-            </a:r>
-            <a:r>
-              <a:rPr lang="en-ZA" dirty="0" smtClean="0"/>
-              <a:t>submission format</a:t>
+              <a:t> submission format</a:t>
             </a:r>
             <a:endParaRPr lang="en-ZA" dirty="0"/>
           </a:p>

</xml_diff>